<commit_message>
update to use email to send message and make model
</commit_message>
<xml_diff>
--- a/sketch.pptx
+++ b/sketch.pptx
@@ -270,7 +270,7 @@
           <a:p>
             <a:fld id="{AD6E3A2F-49FD-4F85-AC0B-F715520ECC56}" type="datetimeFigureOut">
               <a:rPr lang="ko-KR" altLang="en-US" smtClean="0"/>
-              <a:t>2018-12-12</a:t>
+              <a:t>2018-12-15</a:t>
             </a:fld>
             <a:endParaRPr lang="ko-KR" altLang="en-US"/>
           </a:p>
@@ -468,7 +468,7 @@
           <a:p>
             <a:fld id="{AD6E3A2F-49FD-4F85-AC0B-F715520ECC56}" type="datetimeFigureOut">
               <a:rPr lang="ko-KR" altLang="en-US" smtClean="0"/>
-              <a:t>2018-12-12</a:t>
+              <a:t>2018-12-15</a:t>
             </a:fld>
             <a:endParaRPr lang="ko-KR" altLang="en-US"/>
           </a:p>
@@ -676,7 +676,7 @@
           <a:p>
             <a:fld id="{AD6E3A2F-49FD-4F85-AC0B-F715520ECC56}" type="datetimeFigureOut">
               <a:rPr lang="ko-KR" altLang="en-US" smtClean="0"/>
-              <a:t>2018-12-12</a:t>
+              <a:t>2018-12-15</a:t>
             </a:fld>
             <a:endParaRPr lang="ko-KR" altLang="en-US"/>
           </a:p>
@@ -874,7 +874,7 @@
           <a:p>
             <a:fld id="{AD6E3A2F-49FD-4F85-AC0B-F715520ECC56}" type="datetimeFigureOut">
               <a:rPr lang="ko-KR" altLang="en-US" smtClean="0"/>
-              <a:t>2018-12-12</a:t>
+              <a:t>2018-12-15</a:t>
             </a:fld>
             <a:endParaRPr lang="ko-KR" altLang="en-US"/>
           </a:p>
@@ -1149,7 +1149,7 @@
           <a:p>
             <a:fld id="{AD6E3A2F-49FD-4F85-AC0B-F715520ECC56}" type="datetimeFigureOut">
               <a:rPr lang="ko-KR" altLang="en-US" smtClean="0"/>
-              <a:t>2018-12-12</a:t>
+              <a:t>2018-12-15</a:t>
             </a:fld>
             <a:endParaRPr lang="ko-KR" altLang="en-US"/>
           </a:p>
@@ -1414,7 +1414,7 @@
           <a:p>
             <a:fld id="{AD6E3A2F-49FD-4F85-AC0B-F715520ECC56}" type="datetimeFigureOut">
               <a:rPr lang="ko-KR" altLang="en-US" smtClean="0"/>
-              <a:t>2018-12-12</a:t>
+              <a:t>2018-12-15</a:t>
             </a:fld>
             <a:endParaRPr lang="ko-KR" altLang="en-US"/>
           </a:p>
@@ -1826,7 +1826,7 @@
           <a:p>
             <a:fld id="{AD6E3A2F-49FD-4F85-AC0B-F715520ECC56}" type="datetimeFigureOut">
               <a:rPr lang="ko-KR" altLang="en-US" smtClean="0"/>
-              <a:t>2018-12-12</a:t>
+              <a:t>2018-12-15</a:t>
             </a:fld>
             <a:endParaRPr lang="ko-KR" altLang="en-US"/>
           </a:p>
@@ -1967,7 +1967,7 @@
           <a:p>
             <a:fld id="{AD6E3A2F-49FD-4F85-AC0B-F715520ECC56}" type="datetimeFigureOut">
               <a:rPr lang="ko-KR" altLang="en-US" smtClean="0"/>
-              <a:t>2018-12-12</a:t>
+              <a:t>2018-12-15</a:t>
             </a:fld>
             <a:endParaRPr lang="ko-KR" altLang="en-US"/>
           </a:p>
@@ -2080,7 +2080,7 @@
           <a:p>
             <a:fld id="{AD6E3A2F-49FD-4F85-AC0B-F715520ECC56}" type="datetimeFigureOut">
               <a:rPr lang="ko-KR" altLang="en-US" smtClean="0"/>
-              <a:t>2018-12-12</a:t>
+              <a:t>2018-12-15</a:t>
             </a:fld>
             <a:endParaRPr lang="ko-KR" altLang="en-US"/>
           </a:p>
@@ -2391,7 +2391,7 @@
           <a:p>
             <a:fld id="{AD6E3A2F-49FD-4F85-AC0B-F715520ECC56}" type="datetimeFigureOut">
               <a:rPr lang="ko-KR" altLang="en-US" smtClean="0"/>
-              <a:t>2018-12-12</a:t>
+              <a:t>2018-12-15</a:t>
             </a:fld>
             <a:endParaRPr lang="ko-KR" altLang="en-US"/>
           </a:p>
@@ -2679,7 +2679,7 @@
           <a:p>
             <a:fld id="{AD6E3A2F-49FD-4F85-AC0B-F715520ECC56}" type="datetimeFigureOut">
               <a:rPr lang="ko-KR" altLang="en-US" smtClean="0"/>
-              <a:t>2018-12-12</a:t>
+              <a:t>2018-12-15</a:t>
             </a:fld>
             <a:endParaRPr lang="ko-KR" altLang="en-US"/>
           </a:p>
@@ -2920,7 +2920,7 @@
           <a:p>
             <a:fld id="{AD6E3A2F-49FD-4F85-AC0B-F715520ECC56}" type="datetimeFigureOut">
               <a:rPr lang="ko-KR" altLang="en-US" smtClean="0"/>
-              <a:t>2018-12-12</a:t>
+              <a:t>2018-12-15</a:t>
             </a:fld>
             <a:endParaRPr lang="ko-KR" altLang="en-US"/>
           </a:p>
@@ -3352,7 +3352,7 @@
         <p:spPr>
           <a:xfrm>
             <a:off x="681387" y="640081"/>
-            <a:ext cx="3957288" cy="3293209"/>
+            <a:ext cx="3957288" cy="2369880"/>
           </a:xfrm>
           <a:prstGeom prst="rect">
             <a:avLst/>
@@ -3506,98 +3506,16 @@
               <a:t>ManyToMany</a:t>
             </a:r>
             <a:r>
-              <a:rPr lang="en-US" altLang="ko-KR" sz="2000" dirty="0">
+              <a:rPr lang="en-US" altLang="ko-KR" sz="2000">
                 <a:latin typeface="나눔스퀘어 Light" panose="020B0600000101010101" pitchFamily="50" charset="-127"/>
                 <a:ea typeface="나눔스퀘어 Light" panose="020B0600000101010101" pitchFamily="50" charset="-127"/>
               </a:rPr>
               <a:t>)</a:t>
-            </a:r>
-          </a:p>
-          <a:p>
-            <a:pPr marL="285750" indent="-285750">
-              <a:buFontTx/>
-              <a:buChar char="-"/>
-            </a:pPr>
-            <a:r>
-              <a:rPr lang="ko-KR" altLang="en-US" sz="2000" dirty="0" err="1">
-                <a:latin typeface="나눔스퀘어 Light" panose="020B0600000101010101" pitchFamily="50" charset="-127"/>
-                <a:ea typeface="나눔스퀘어 Light" panose="020B0600000101010101" pitchFamily="50" charset="-127"/>
-              </a:rPr>
-              <a:t>페북</a:t>
-            </a:r>
-            <a:r>
-              <a:rPr lang="ko-KR" altLang="en-US" sz="2000" dirty="0">
-                <a:latin typeface="나눔스퀘어 Light" panose="020B0600000101010101" pitchFamily="50" charset="-127"/>
-                <a:ea typeface="나눔스퀘어 Light" panose="020B0600000101010101" pitchFamily="50" charset="-127"/>
-              </a:rPr>
-              <a:t> 이름</a:t>
             </a:r>
             <a:endParaRPr lang="en-US" altLang="ko-KR" sz="2000" dirty="0">
               <a:latin typeface="나눔스퀘어 Light" panose="020B0600000101010101" pitchFamily="50" charset="-127"/>
               <a:ea typeface="나눔스퀘어 Light" panose="020B0600000101010101" pitchFamily="50" charset="-127"/>
             </a:endParaRPr>
-          </a:p>
-          <a:p>
-            <a:pPr marL="285750" indent="-285750">
-              <a:buFontTx/>
-              <a:buChar char="-"/>
-            </a:pPr>
-            <a:r>
-              <a:rPr lang="ko-KR" altLang="en-US" sz="2000" dirty="0" err="1">
-                <a:latin typeface="나눔스퀘어 Light" panose="020B0600000101010101" pitchFamily="50" charset="-127"/>
-                <a:ea typeface="나눔스퀘어 Light" panose="020B0600000101010101" pitchFamily="50" charset="-127"/>
-              </a:rPr>
-              <a:t>페북</a:t>
-            </a:r>
-            <a:r>
-              <a:rPr lang="ko-KR" altLang="en-US" sz="2000" dirty="0">
-                <a:latin typeface="나눔스퀘어 Light" panose="020B0600000101010101" pitchFamily="50" charset="-127"/>
-                <a:ea typeface="나눔스퀘어 Light" panose="020B0600000101010101" pitchFamily="50" charset="-127"/>
-              </a:rPr>
-              <a:t> </a:t>
-            </a:r>
-            <a:r>
-              <a:rPr lang="en-US" altLang="ko-KR" sz="2000" dirty="0" err="1">
-                <a:latin typeface="나눔스퀘어 Light" panose="020B0600000101010101" pitchFamily="50" charset="-127"/>
-                <a:ea typeface="나눔스퀘어 Light" panose="020B0600000101010101" pitchFamily="50" charset="-127"/>
-              </a:rPr>
-              <a:t>uid</a:t>
-            </a:r>
-            <a:r>
-              <a:rPr lang="en-US" altLang="ko-KR" sz="2000" dirty="0">
-                <a:latin typeface="나눔스퀘어 Light" panose="020B0600000101010101" pitchFamily="50" charset="-127"/>
-                <a:ea typeface="나눔스퀘어 Light" panose="020B0600000101010101" pitchFamily="50" charset="-127"/>
-              </a:rPr>
-              <a:t>(</a:t>
-            </a:r>
-            <a:r>
-              <a:rPr lang="ko-KR" altLang="en-US" sz="2000" dirty="0">
-                <a:latin typeface="나눔스퀘어 Light" panose="020B0600000101010101" pitchFamily="50" charset="-127"/>
-                <a:ea typeface="나눔스퀘어 Light" panose="020B0600000101010101" pitchFamily="50" charset="-127"/>
-              </a:rPr>
-              <a:t>자동으로</a:t>
-            </a:r>
-            <a:r>
-              <a:rPr lang="en-US" altLang="ko-KR" sz="2000" dirty="0">
-                <a:latin typeface="나눔스퀘어 Light" panose="020B0600000101010101" pitchFamily="50" charset="-127"/>
-                <a:ea typeface="나눔스퀘어 Light" panose="020B0600000101010101" pitchFamily="50" charset="-127"/>
-              </a:rPr>
-              <a:t> &lt;- </a:t>
-            </a:r>
-            <a:r>
-              <a:rPr lang="ko-KR" altLang="en-US" sz="2000" dirty="0">
-                <a:latin typeface="나눔스퀘어 Light" panose="020B0600000101010101" pitchFamily="50" charset="-127"/>
-                <a:ea typeface="나눔스퀘어 Light" panose="020B0600000101010101" pitchFamily="50" charset="-127"/>
-              </a:rPr>
-              <a:t>이름이 겹칠 수도 있으니</a:t>
-            </a:r>
-            <a:r>
-              <a:rPr lang="en-US" altLang="ko-KR" sz="2000" dirty="0">
-                <a:latin typeface="나눔스퀘어 Light" panose="020B0600000101010101" pitchFamily="50" charset="-127"/>
-                <a:ea typeface="나눔스퀘어 Light" panose="020B0600000101010101" pitchFamily="50" charset="-127"/>
-              </a:rPr>
-              <a:t>)</a:t>
-            </a:r>
           </a:p>
         </p:txBody>
       </p:sp>

</xml_diff>